<commit_message>
Added general monitoring to Section 2.
</commit_message>
<xml_diff>
--- a/images/general_monitoring_scheme.pptx
+++ b/images/general_monitoring_scheme.pptx
@@ -5543,7 +5543,7 @@
         </p:nvSpPr>
         <p:spPr bwMode="auto">
           <a:xfrm>
-            <a:off x="6400800" y="1143000"/>
+            <a:off x="5486400" y="1143000"/>
             <a:ext cx="1104694" cy="740375"/>
           </a:xfrm>
           <a:prstGeom prst="rect">
@@ -6511,6 +6511,57 @@
           </a:p>
         </p:txBody>
       </p:sp>
+      <p:sp>
+        <p:nvSpPr>
+          <p:cNvPr id="91" name="Rectangle 9"/>
+          <p:cNvSpPr>
+            <a:spLocks noChangeArrowheads="1"/>
+          </p:cNvSpPr>
+          <p:nvPr/>
+        </p:nvSpPr>
+        <p:spPr bwMode="auto">
+          <a:xfrm>
+            <a:off x="7086600" y="1164625"/>
+            <a:ext cx="1104694" cy="740375"/>
+          </a:xfrm>
+          <a:prstGeom prst="rect">
+            <a:avLst/>
+          </a:prstGeom>
+          <a:ln>
+            <a:headEnd/>
+            <a:tailEnd/>
+          </a:ln>
+        </p:spPr>
+        <p:style>
+          <a:lnRef idx="2">
+            <a:schemeClr val="dk1"/>
+          </a:lnRef>
+          <a:fillRef idx="1">
+            <a:schemeClr val="lt1"/>
+          </a:fillRef>
+          <a:effectRef idx="0">
+            <a:schemeClr val="dk1"/>
+          </a:effectRef>
+          <a:fontRef idx="minor">
+            <a:schemeClr val="dk1"/>
+          </a:fontRef>
+        </p:style>
+        <p:txBody>
+          <a:bodyPr vert="horz" wrap="square" lIns="91440" tIns="45720" rIns="91440" bIns="45720" numCol="1" anchor="t" anchorCtr="0" compatLnSpc="1">
+            <a:prstTxWarp prst="textNoShape">
+              <a:avLst/>
+            </a:prstTxWarp>
+          </a:bodyPr>
+          <a:lstStyle/>
+          <a:p>
+            <a:r>
+              <a:rPr lang="en-IN" sz="2000" b="1" dirty="0" smtClean="0"/>
+              <a:t>Objects</a:t>
+            </a:r>
+            <a:endParaRPr lang="en-IN" sz="2000" b="1" dirty="0"/>
+          </a:p>
+        </p:txBody>
+      </p:sp>
     </p:spTree>
   </p:cSld>
   <p:clrMapOvr>

</xml_diff>